<commit_message>
modify read register result
</commit_message>
<xml_diff>
--- a/Monitor/操作說明.pptx
+++ b/Monitor/操作說明.pptx
@@ -129,10 +129,6 @@
     </p:ext>
   </p:extLst>
 </p:presentation>
-</file>
-
-<file path=ppt/revisionInfo.xml><?xml version="1.0" encoding="utf-8"?>
-<p1510:revInfo xmlns:a="http://schemas.openxmlformats.org/drawingml/2006/main" xmlns:r="http://schemas.openxmlformats.org/officeDocument/2006/relationships" xmlns:p1510="http://schemas.microsoft.com/office/powerpoint/2015/10/main"/>
 </file>
 
 <file path=ppt/slideLayouts/slideLayout1.xml><?xml version="1.0" encoding="utf-8"?>
@@ -929,7 +925,7 @@
           <a:p>
             <a:fld id="{5BBEAD13-0566-4C6C-97E7-55F17F24B09F}" type="datetimeFigureOut">
               <a:rPr lang="zh-TW" altLang="en-US" smtClean="0"/>
-              <a:t>2019/6/19</a:t>
+              <a:t>2019/8/21</a:t>
             </a:fld>
             <a:endParaRPr lang="zh-TW" altLang="en-US"/>
           </a:p>
@@ -1180,7 +1176,7 @@
           <a:p>
             <a:fld id="{5BBEAD13-0566-4C6C-97E7-55F17F24B09F}" type="datetimeFigureOut">
               <a:rPr lang="zh-TW" altLang="en-US" smtClean="0"/>
-              <a:t>2019/6/19</a:t>
+              <a:t>2019/8/21</a:t>
             </a:fld>
             <a:endParaRPr lang="zh-TW" altLang="en-US"/>
           </a:p>
@@ -1494,7 +1490,7 @@
           <a:p>
             <a:fld id="{5BBEAD13-0566-4C6C-97E7-55F17F24B09F}" type="datetimeFigureOut">
               <a:rPr lang="zh-TW" altLang="en-US" smtClean="0"/>
-              <a:t>2019/6/19</a:t>
+              <a:t>2019/8/21</a:t>
             </a:fld>
             <a:endParaRPr lang="zh-TW" altLang="en-US"/>
           </a:p>
@@ -1827,7 +1823,7 @@
           <a:p>
             <a:fld id="{5BBEAD13-0566-4C6C-97E7-55F17F24B09F}" type="datetimeFigureOut">
               <a:rPr lang="zh-TW" altLang="en-US" smtClean="0"/>
-              <a:t>2019/6/19</a:t>
+              <a:t>2019/8/21</a:t>
             </a:fld>
             <a:endParaRPr lang="zh-TW" altLang="en-US"/>
           </a:p>
@@ -2141,7 +2137,7 @@
           <a:p>
             <a:fld id="{5BBEAD13-0566-4C6C-97E7-55F17F24B09F}" type="datetimeFigureOut">
               <a:rPr lang="zh-TW" altLang="en-US" smtClean="0"/>
-              <a:t>2019/6/19</a:t>
+              <a:t>2019/8/21</a:t>
             </a:fld>
             <a:endParaRPr lang="zh-TW" altLang="en-US"/>
           </a:p>
@@ -2534,7 +2530,7 @@
           <a:p>
             <a:fld id="{5BBEAD13-0566-4C6C-97E7-55F17F24B09F}" type="datetimeFigureOut">
               <a:rPr lang="zh-TW" altLang="en-US" smtClean="0"/>
-              <a:t>2019/6/19</a:t>
+              <a:t>2019/8/21</a:t>
             </a:fld>
             <a:endParaRPr lang="zh-TW" altLang="en-US"/>
           </a:p>
@@ -2704,7 +2700,7 @@
           <a:p>
             <a:fld id="{5BBEAD13-0566-4C6C-97E7-55F17F24B09F}" type="datetimeFigureOut">
               <a:rPr lang="zh-TW" altLang="en-US" smtClean="0"/>
-              <a:t>2019/6/19</a:t>
+              <a:t>2019/8/21</a:t>
             </a:fld>
             <a:endParaRPr lang="zh-TW" altLang="en-US"/>
           </a:p>
@@ -2884,7 +2880,7 @@
           <a:p>
             <a:fld id="{5BBEAD13-0566-4C6C-97E7-55F17F24B09F}" type="datetimeFigureOut">
               <a:rPr lang="zh-TW" altLang="en-US" smtClean="0"/>
-              <a:t>2019/6/19</a:t>
+              <a:t>2019/8/21</a:t>
             </a:fld>
             <a:endParaRPr lang="zh-TW" altLang="en-US"/>
           </a:p>
@@ -3054,7 +3050,7 @@
           <a:p>
             <a:fld id="{5BBEAD13-0566-4C6C-97E7-55F17F24B09F}" type="datetimeFigureOut">
               <a:rPr lang="zh-TW" altLang="en-US" smtClean="0"/>
-              <a:t>2019/6/19</a:t>
+              <a:t>2019/8/21</a:t>
             </a:fld>
             <a:endParaRPr lang="zh-TW" altLang="en-US"/>
           </a:p>
@@ -3301,7 +3297,7 @@
           <a:p>
             <a:fld id="{5BBEAD13-0566-4C6C-97E7-55F17F24B09F}" type="datetimeFigureOut">
               <a:rPr lang="zh-TW" altLang="en-US" smtClean="0"/>
-              <a:t>2019/6/19</a:t>
+              <a:t>2019/8/21</a:t>
             </a:fld>
             <a:endParaRPr lang="zh-TW" altLang="en-US"/>
           </a:p>
@@ -3598,7 +3594,7 @@
           <a:p>
             <a:fld id="{5BBEAD13-0566-4C6C-97E7-55F17F24B09F}" type="datetimeFigureOut">
               <a:rPr lang="zh-TW" altLang="en-US" smtClean="0"/>
-              <a:t>2019/6/19</a:t>
+              <a:t>2019/8/21</a:t>
             </a:fld>
             <a:endParaRPr lang="zh-TW" altLang="en-US"/>
           </a:p>
@@ -3977,7 +3973,7 @@
           <a:p>
             <a:fld id="{5BBEAD13-0566-4C6C-97E7-55F17F24B09F}" type="datetimeFigureOut">
               <a:rPr lang="zh-TW" altLang="en-US" smtClean="0"/>
-              <a:t>2019/6/19</a:t>
+              <a:t>2019/8/21</a:t>
             </a:fld>
             <a:endParaRPr lang="zh-TW" altLang="en-US"/>
           </a:p>
@@ -4100,7 +4096,7 @@
           <a:p>
             <a:fld id="{5BBEAD13-0566-4C6C-97E7-55F17F24B09F}" type="datetimeFigureOut">
               <a:rPr lang="zh-TW" altLang="en-US" smtClean="0"/>
-              <a:t>2019/6/19</a:t>
+              <a:t>2019/8/21</a:t>
             </a:fld>
             <a:endParaRPr lang="zh-TW" altLang="en-US"/>
           </a:p>
@@ -4195,7 +4191,7 @@
           <a:p>
             <a:fld id="{5BBEAD13-0566-4C6C-97E7-55F17F24B09F}" type="datetimeFigureOut">
               <a:rPr lang="zh-TW" altLang="en-US" smtClean="0"/>
-              <a:t>2019/6/19</a:t>
+              <a:t>2019/8/21</a:t>
             </a:fld>
             <a:endParaRPr lang="zh-TW" altLang="en-US"/>
           </a:p>
@@ -4450,7 +4446,7 @@
           <a:p>
             <a:fld id="{5BBEAD13-0566-4C6C-97E7-55F17F24B09F}" type="datetimeFigureOut">
               <a:rPr lang="zh-TW" altLang="en-US" smtClean="0"/>
-              <a:t>2019/6/19</a:t>
+              <a:t>2019/8/21</a:t>
             </a:fld>
             <a:endParaRPr lang="zh-TW" altLang="en-US"/>
           </a:p>
@@ -4713,7 +4709,7 @@
           <a:p>
             <a:fld id="{5BBEAD13-0566-4C6C-97E7-55F17F24B09F}" type="datetimeFigureOut">
               <a:rPr lang="zh-TW" altLang="en-US" smtClean="0"/>
-              <a:t>2019/6/19</a:t>
+              <a:t>2019/8/21</a:t>
             </a:fld>
             <a:endParaRPr lang="zh-TW" altLang="en-US"/>
           </a:p>
@@ -5527,7 +5523,7 @@
           <a:p>
             <a:fld id="{5BBEAD13-0566-4C6C-97E7-55F17F24B09F}" type="datetimeFigureOut">
               <a:rPr lang="zh-TW" altLang="en-US" smtClean="0"/>
-              <a:t>2019/6/19</a:t>
+              <a:t>2019/8/21</a:t>
             </a:fld>
             <a:endParaRPr lang="zh-TW" altLang="en-US"/>
           </a:p>
@@ -6205,6 +6201,58 @@
           <a:p>
             <a:pPr lvl="1"/>
             <a:r>
+              <a:rPr lang="zh-CN" altLang="en-US" sz="1200" dirty="0">
+                <a:latin typeface="微軟正黑體" panose="020B0604030504040204" pitchFamily="34" charset="-120"/>
+                <a:ea typeface="微軟正黑體" panose="020B0604030504040204" pitchFamily="34" charset="-120"/>
+              </a:rPr>
+              <a:t>驱动版本设定</a:t>
+            </a:r>
+            <a:r>
+              <a:rPr lang="en-US" altLang="zh-CN" sz="1200" dirty="0">
+                <a:latin typeface="微軟正黑體" panose="020B0604030504040204" pitchFamily="34" charset="-120"/>
+                <a:ea typeface="微軟正黑體" panose="020B0604030504040204" pitchFamily="34" charset="-120"/>
+              </a:rPr>
+              <a:t>V2</a:t>
+            </a:r>
+            <a:r>
+              <a:rPr lang="zh-CN" altLang="en-US" sz="1200" dirty="0">
+                <a:latin typeface="微軟正黑體" panose="020B0604030504040204" pitchFamily="34" charset="-120"/>
+                <a:ea typeface="微軟正黑體" panose="020B0604030504040204" pitchFamily="34" charset="-120"/>
+              </a:rPr>
+              <a:t>或者</a:t>
+            </a:r>
+            <a:r>
+              <a:rPr lang="en-US" altLang="zh-CN" sz="1200" dirty="0">
+                <a:latin typeface="微軟正黑體" panose="020B0604030504040204" pitchFamily="34" charset="-120"/>
+                <a:ea typeface="微軟正黑體" panose="020B0604030504040204" pitchFamily="34" charset="-120"/>
+              </a:rPr>
+              <a:t>V1</a:t>
+            </a:r>
+          </a:p>
+          <a:p>
+            <a:pPr lvl="2"/>
+            <a:r>
+              <a:rPr lang="zh-CN" altLang="en-US" sz="1000" dirty="0">
+                <a:latin typeface="微軟正黑體" panose="020B0604030504040204" pitchFamily="34" charset="-120"/>
+                <a:ea typeface="微軟正黑體" panose="020B0604030504040204" pitchFamily="34" charset="-120"/>
+              </a:rPr>
+              <a:t>例如：在文档首行</a:t>
+            </a:r>
+            <a:r>
+              <a:rPr lang="en-US" altLang="zh-CN" sz="1000" dirty="0">
+                <a:latin typeface="微軟正黑體" panose="020B0604030504040204" pitchFamily="34" charset="-120"/>
+                <a:ea typeface="微軟正黑體" panose="020B0604030504040204" pitchFamily="34" charset="-120"/>
+              </a:rPr>
+              <a:t>DRIVER_VERSION = V2</a:t>
+            </a:r>
+            <a:endParaRPr lang="en-US" altLang="zh-TW" sz="1000" dirty="0">
+              <a:latin typeface="微軟正黑體" panose="020B0604030504040204" pitchFamily="34" charset="-120"/>
+              <a:ea typeface="微軟正黑體" panose="020B0604030504040204" pitchFamily="34" charset="-120"/>
+            </a:endParaRPr>
+          </a:p>
+          <a:p>
+            <a:pPr lvl="1"/>
+            <a:r>
               <a:rPr lang="zh-TW" altLang="en-US" sz="1200" dirty="0">
                 <a:latin typeface="微軟正黑體" panose="020B0604030504040204" pitchFamily="34" charset="-120"/>
                 <a:ea typeface="微軟正黑體" panose="020B0604030504040204" pitchFamily="34" charset="-120"/>
@@ -6388,10 +6436,10 @@
       </p:sp>
       <p:pic>
         <p:nvPicPr>
-          <p:cNvPr id="4" name="圖片 3">
+          <p:cNvPr id="5" name="圖片 4">
             <a:extLst>
               <a:ext uri="{FF2B5EF4-FFF2-40B4-BE49-F238E27FC236}">
-                <a16:creationId xmlns:a16="http://schemas.microsoft.com/office/drawing/2014/main" id="{F683F605-75BE-46D5-B3EB-C82ADEF0F15B}"/>
+                <a16:creationId xmlns:a16="http://schemas.microsoft.com/office/drawing/2014/main" id="{0AC9931E-593D-476A-9266-CF71AB371321}"/>
               </a:ext>
             </a:extLst>
           </p:cNvPr>
@@ -6408,8 +6456,8 @@
         </p:blipFill>
         <p:spPr>
           <a:xfrm>
-            <a:off x="3563888" y="1294694"/>
-            <a:ext cx="3753932" cy="2026525"/>
+            <a:off x="1907704" y="4716958"/>
+            <a:ext cx="2085975" cy="847725"/>
           </a:xfrm>
           <a:prstGeom prst="rect">
             <a:avLst/>
@@ -6418,10 +6466,10 @@
       </p:pic>
       <p:pic>
         <p:nvPicPr>
-          <p:cNvPr id="5" name="圖片 4">
+          <p:cNvPr id="6" name="图片 5">
             <a:extLst>
               <a:ext uri="{FF2B5EF4-FFF2-40B4-BE49-F238E27FC236}">
-                <a16:creationId xmlns:a16="http://schemas.microsoft.com/office/drawing/2014/main" id="{0AC9931E-593D-476A-9266-CF71AB371321}"/>
+                <a16:creationId xmlns:a16="http://schemas.microsoft.com/office/drawing/2014/main" id="{00385123-3FCC-4B29-A07F-3AD6CBAEB34C}"/>
               </a:ext>
             </a:extLst>
           </p:cNvPr>
@@ -6438,8 +6486,8 @@
         </p:blipFill>
         <p:spPr>
           <a:xfrm>
-            <a:off x="1907704" y="4293096"/>
-            <a:ext cx="2085975" cy="847725"/>
+            <a:off x="4572000" y="463791"/>
+            <a:ext cx="3753932" cy="4677030"/>
           </a:xfrm>
           <a:prstGeom prst="rect">
             <a:avLst/>

</xml_diff>